<commit_message>
adicao de navegacao separada por tipo de usuario
</commit_message>
<xml_diff>
--- a/assets/documentation/Apresentação1.pptx
+++ b/assets/documentation/Apresentação1.pptx
@@ -8,8 +8,10 @@
     <p:sldId id="256" r:id="rId2"/>
     <p:sldId id="257" r:id="rId3"/>
     <p:sldId id="258" r:id="rId4"/>
-    <p:sldId id="260" r:id="rId5"/>
-    <p:sldId id="259" r:id="rId6"/>
+    <p:sldId id="262" r:id="rId5"/>
+    <p:sldId id="261" r:id="rId6"/>
+    <p:sldId id="260" r:id="rId7"/>
+    <p:sldId id="259" r:id="rId8"/>
   </p:sldIdLst>
   <p:sldSz cx="9144000" cy="6858000" type="screen4x3"/>
   <p:notesSz cx="6858000" cy="9144000"/>
@@ -292,7 +294,8 @@
           <a:p>
             <a:fld id="{BD100D23-7871-46BA-A56C-F3E11FB2D67D}" type="datetimeFigureOut">
               <a:rPr lang="pt-BR" smtClean="0"/>
-              <a:t>02/03/2014</a:t>
+              <a:pPr/>
+              <a:t>03/03/2014</a:t>
             </a:fld>
             <a:endParaRPr lang="pt-BR"/>
           </a:p>
@@ -334,6 +337,7 @@
           <a:p>
             <a:fld id="{21A3ED6F-B072-4190-B1BE-825A8C98D92C}" type="slidenum">
               <a:rPr lang="pt-BR" smtClean="0"/>
+              <a:pPr/>
               <a:t>‹nº›</a:t>
             </a:fld>
             <a:endParaRPr lang="pt-BR"/>
@@ -514,7 +518,8 @@
           <a:p>
             <a:fld id="{BD100D23-7871-46BA-A56C-F3E11FB2D67D}" type="datetimeFigureOut">
               <a:rPr lang="pt-BR" smtClean="0"/>
-              <a:t>02/03/2014</a:t>
+              <a:pPr/>
+              <a:t>03/03/2014</a:t>
             </a:fld>
             <a:endParaRPr lang="pt-BR"/>
           </a:p>
@@ -556,6 +561,7 @@
           <a:p>
             <a:fld id="{21A3ED6F-B072-4190-B1BE-825A8C98D92C}" type="slidenum">
               <a:rPr lang="pt-BR" smtClean="0"/>
+              <a:pPr/>
               <a:t>‹nº›</a:t>
             </a:fld>
             <a:endParaRPr lang="pt-BR"/>
@@ -689,7 +695,8 @@
           <a:p>
             <a:fld id="{BD100D23-7871-46BA-A56C-F3E11FB2D67D}" type="datetimeFigureOut">
               <a:rPr lang="pt-BR" smtClean="0"/>
-              <a:t>02/03/2014</a:t>
+              <a:pPr/>
+              <a:t>03/03/2014</a:t>
             </a:fld>
             <a:endParaRPr lang="pt-BR"/>
           </a:p>
@@ -731,6 +738,7 @@
           <a:p>
             <a:fld id="{21A3ED6F-B072-4190-B1BE-825A8C98D92C}" type="slidenum">
               <a:rPr lang="pt-BR" smtClean="0"/>
+              <a:pPr/>
               <a:t>‹nº›</a:t>
             </a:fld>
             <a:endParaRPr lang="pt-BR"/>
@@ -854,7 +862,8 @@
           <a:p>
             <a:fld id="{BD100D23-7871-46BA-A56C-F3E11FB2D67D}" type="datetimeFigureOut">
               <a:rPr lang="pt-BR" smtClean="0"/>
-              <a:t>02/03/2014</a:t>
+              <a:pPr/>
+              <a:t>03/03/2014</a:t>
             </a:fld>
             <a:endParaRPr lang="pt-BR"/>
           </a:p>
@@ -896,6 +905,7 @@
           <a:p>
             <a:fld id="{21A3ED6F-B072-4190-B1BE-825A8C98D92C}" type="slidenum">
               <a:rPr lang="pt-BR" smtClean="0"/>
+              <a:pPr/>
               <a:t>‹nº›</a:t>
             </a:fld>
             <a:endParaRPr lang="pt-BR"/>
@@ -1095,7 +1105,8 @@
           <a:p>
             <a:fld id="{BD100D23-7871-46BA-A56C-F3E11FB2D67D}" type="datetimeFigureOut">
               <a:rPr lang="pt-BR" smtClean="0"/>
-              <a:t>02/03/2014</a:t>
+              <a:pPr/>
+              <a:t>03/03/2014</a:t>
             </a:fld>
             <a:endParaRPr lang="pt-BR"/>
           </a:p>
@@ -1137,6 +1148,7 @@
           <a:p>
             <a:fld id="{21A3ED6F-B072-4190-B1BE-825A8C98D92C}" type="slidenum">
               <a:rPr lang="pt-BR" smtClean="0"/>
+              <a:pPr/>
               <a:t>‹nº›</a:t>
             </a:fld>
             <a:endParaRPr lang="pt-BR"/>
@@ -1378,7 +1390,8 @@
           <a:p>
             <a:fld id="{BD100D23-7871-46BA-A56C-F3E11FB2D67D}" type="datetimeFigureOut">
               <a:rPr lang="pt-BR" smtClean="0"/>
-              <a:t>02/03/2014</a:t>
+              <a:pPr/>
+              <a:t>03/03/2014</a:t>
             </a:fld>
             <a:endParaRPr lang="pt-BR"/>
           </a:p>
@@ -1420,6 +1433,7 @@
           <a:p>
             <a:fld id="{21A3ED6F-B072-4190-B1BE-825A8C98D92C}" type="slidenum">
               <a:rPr lang="pt-BR" smtClean="0"/>
+              <a:pPr/>
               <a:t>‹nº›</a:t>
             </a:fld>
             <a:endParaRPr lang="pt-BR"/>
@@ -1795,7 +1809,8 @@
           <a:p>
             <a:fld id="{BD100D23-7871-46BA-A56C-F3E11FB2D67D}" type="datetimeFigureOut">
               <a:rPr lang="pt-BR" smtClean="0"/>
-              <a:t>02/03/2014</a:t>
+              <a:pPr/>
+              <a:t>03/03/2014</a:t>
             </a:fld>
             <a:endParaRPr lang="pt-BR"/>
           </a:p>
@@ -1837,6 +1852,7 @@
           <a:p>
             <a:fld id="{21A3ED6F-B072-4190-B1BE-825A8C98D92C}" type="slidenum">
               <a:rPr lang="pt-BR" smtClean="0"/>
+              <a:pPr/>
               <a:t>‹nº›</a:t>
             </a:fld>
             <a:endParaRPr lang="pt-BR"/>
@@ -1908,7 +1924,8 @@
           <a:p>
             <a:fld id="{BD100D23-7871-46BA-A56C-F3E11FB2D67D}" type="datetimeFigureOut">
               <a:rPr lang="pt-BR" smtClean="0"/>
-              <a:t>02/03/2014</a:t>
+              <a:pPr/>
+              <a:t>03/03/2014</a:t>
             </a:fld>
             <a:endParaRPr lang="pt-BR"/>
           </a:p>
@@ -1950,6 +1967,7 @@
           <a:p>
             <a:fld id="{21A3ED6F-B072-4190-B1BE-825A8C98D92C}" type="slidenum">
               <a:rPr lang="pt-BR" smtClean="0"/>
+              <a:pPr/>
               <a:t>‹nº›</a:t>
             </a:fld>
             <a:endParaRPr lang="pt-BR"/>
@@ -1998,7 +2016,8 @@
           <a:p>
             <a:fld id="{BD100D23-7871-46BA-A56C-F3E11FB2D67D}" type="datetimeFigureOut">
               <a:rPr lang="pt-BR" smtClean="0"/>
-              <a:t>02/03/2014</a:t>
+              <a:pPr/>
+              <a:t>03/03/2014</a:t>
             </a:fld>
             <a:endParaRPr lang="pt-BR"/>
           </a:p>
@@ -2040,6 +2059,7 @@
           <a:p>
             <a:fld id="{21A3ED6F-B072-4190-B1BE-825A8C98D92C}" type="slidenum">
               <a:rPr lang="pt-BR" smtClean="0"/>
+              <a:pPr/>
               <a:t>‹nº›</a:t>
             </a:fld>
             <a:endParaRPr lang="pt-BR"/>
@@ -2270,7 +2290,8 @@
           <a:p>
             <a:fld id="{BD100D23-7871-46BA-A56C-F3E11FB2D67D}" type="datetimeFigureOut">
               <a:rPr lang="pt-BR" smtClean="0"/>
-              <a:t>02/03/2014</a:t>
+              <a:pPr/>
+              <a:t>03/03/2014</a:t>
             </a:fld>
             <a:endParaRPr lang="pt-BR"/>
           </a:p>
@@ -2312,6 +2333,7 @@
           <a:p>
             <a:fld id="{21A3ED6F-B072-4190-B1BE-825A8C98D92C}" type="slidenum">
               <a:rPr lang="pt-BR" smtClean="0"/>
+              <a:pPr/>
               <a:t>‹nº›</a:t>
             </a:fld>
             <a:endParaRPr lang="pt-BR"/>
@@ -2518,7 +2540,8 @@
           <a:p>
             <a:fld id="{BD100D23-7871-46BA-A56C-F3E11FB2D67D}" type="datetimeFigureOut">
               <a:rPr lang="pt-BR" smtClean="0"/>
-              <a:t>02/03/2014</a:t>
+              <a:pPr/>
+              <a:t>03/03/2014</a:t>
             </a:fld>
             <a:endParaRPr lang="pt-BR"/>
           </a:p>
@@ -2560,6 +2583,7 @@
           <a:p>
             <a:fld id="{21A3ED6F-B072-4190-B1BE-825A8C98D92C}" type="slidenum">
               <a:rPr lang="pt-BR" smtClean="0"/>
+              <a:pPr/>
               <a:t>‹nº›</a:t>
             </a:fld>
             <a:endParaRPr lang="pt-BR"/>
@@ -2726,7 +2750,8 @@
           <a:p>
             <a:fld id="{BD100D23-7871-46BA-A56C-F3E11FB2D67D}" type="datetimeFigureOut">
               <a:rPr lang="pt-BR" smtClean="0"/>
-              <a:t>02/03/2014</a:t>
+              <a:pPr/>
+              <a:t>03/03/2014</a:t>
             </a:fld>
             <a:endParaRPr lang="pt-BR"/>
           </a:p>
@@ -2804,6 +2829,7 @@
           <a:p>
             <a:fld id="{21A3ED6F-B072-4190-B1BE-825A8C98D92C}" type="slidenum">
               <a:rPr lang="pt-BR" smtClean="0"/>
+              <a:pPr/>
               <a:t>‹nº›</a:t>
             </a:fld>
             <a:endParaRPr lang="pt-BR"/>
@@ -3122,7 +3148,7 @@
             <a:r>
               <a:rPr lang="pt-BR" sz="3600" b="1" dirty="0" smtClean="0">
                 <a:solidFill>
-                  <a:srgbClr val="FFC000"/>
+                  <a:srgbClr val="FFA10E"/>
                 </a:solidFill>
               </a:rPr>
               <a:t>Apresentação</a:t>
@@ -3160,14 +3186,14 @@
             <a:r>
               <a:rPr lang="pt-BR" sz="3600" b="1" dirty="0" smtClean="0">
                 <a:solidFill>
-                  <a:srgbClr val="FFC000"/>
+                  <a:srgbClr val="FFA10E"/>
                 </a:solidFill>
               </a:rPr>
               <a:t>FIAP – Linhas Aéreas</a:t>
             </a:r>
             <a:endParaRPr lang="pt-BR" sz="3600" b="1" dirty="0">
               <a:solidFill>
-                <a:srgbClr val="FFC000"/>
+                <a:srgbClr val="FFA10E"/>
               </a:solidFill>
             </a:endParaRPr>
           </a:p>
@@ -3230,14 +3256,14 @@
             <a:r>
               <a:rPr lang="pt-BR" sz="2400" b="1" dirty="0" smtClean="0">
                 <a:solidFill>
-                  <a:srgbClr val="FFC000"/>
+                  <a:srgbClr val="FFA10E"/>
                 </a:solidFill>
               </a:rPr>
               <a:t>Conteúdo</a:t>
             </a:r>
             <a:endParaRPr lang="pt-BR" sz="2400" b="1" dirty="0">
               <a:solidFill>
-                <a:srgbClr val="FFC000"/>
+                <a:srgbClr val="FFA10E"/>
               </a:solidFill>
             </a:endParaRPr>
           </a:p>
@@ -3286,18 +3312,14 @@
             <a:r>
               <a:rPr lang="pt-BR" sz="3200" b="1" dirty="0" smtClean="0">
                 <a:solidFill>
-                  <a:schemeClr val="bg1">
-                    <a:lumMod val="65000"/>
-                  </a:schemeClr>
+                  <a:srgbClr val="92D050"/>
                 </a:solidFill>
               </a:rPr>
               <a:t>Organização do Projeto</a:t>
             </a:r>
             <a:endParaRPr lang="pt-BR" sz="3200" b="1" dirty="0">
               <a:solidFill>
-                <a:schemeClr val="bg1">
-                  <a:lumMod val="65000"/>
-                </a:schemeClr>
+                <a:srgbClr val="92D050"/>
               </a:solidFill>
             </a:endParaRPr>
           </a:p>
@@ -3360,7 +3382,27 @@
                   </a:schemeClr>
                 </a:solidFill>
               </a:rPr>
-              <a:t>O que não pode ser feito</a:t>
+              <a:t>O que não </a:t>
+            </a:r>
+            <a:r>
+              <a:rPr lang="pt-BR" sz="3200" b="1" dirty="0" smtClean="0">
+                <a:solidFill>
+                  <a:schemeClr val="bg1">
+                    <a:lumMod val="65000"/>
+                  </a:schemeClr>
+                </a:solidFill>
+              </a:rPr>
+              <a:t>pôde </a:t>
+            </a:r>
+            <a:r>
+              <a:rPr lang="pt-BR" sz="3200" b="1" dirty="0" smtClean="0">
+                <a:solidFill>
+                  <a:schemeClr val="bg1">
+                    <a:lumMod val="65000"/>
+                  </a:schemeClr>
+                </a:solidFill>
+              </a:rPr>
+              <a:t>ser feito</a:t>
             </a:r>
           </a:p>
           <a:p>
@@ -3435,7 +3477,7 @@
         <p:spPr>
           <a:xfrm>
             <a:off x="102405" y="109815"/>
-            <a:ext cx="1632948" cy="461665"/>
+            <a:ext cx="3150799" cy="461665"/>
           </a:xfrm>
           <a:prstGeom prst="rect">
             <a:avLst/>
@@ -3451,74 +3493,124 @@
             <a:r>
               <a:rPr lang="pt-BR" sz="2400" b="1" dirty="0" smtClean="0">
                 <a:solidFill>
-                  <a:srgbClr val="FFC000"/>
+                  <a:srgbClr val="FFA10E"/>
                 </a:solidFill>
               </a:rPr>
-              <a:t>Integrantes</a:t>
+              <a:t>Organização do projeto</a:t>
             </a:r>
             <a:endParaRPr lang="pt-BR" sz="2400" b="1" dirty="0">
               <a:solidFill>
-                <a:srgbClr val="FFC000"/>
+                <a:srgbClr val="FFA10E"/>
               </a:solidFill>
             </a:endParaRPr>
           </a:p>
         </p:txBody>
       </p:sp>
-      <p:sp>
-        <p:nvSpPr>
-          <p:cNvPr id="8" name="CaixaDeTexto 7"/>
-          <p:cNvSpPr txBox="1"/>
+      <p:pic>
+        <p:nvPicPr>
+          <p:cNvPr id="1028" name="Picture 4"/>
+          <p:cNvPicPr>
+            <a:picLocks noChangeAspect="1" noChangeArrowheads="1"/>
+          </p:cNvPicPr>
           <p:nvPr/>
-        </p:nvSpPr>
-        <p:spPr>
+        </p:nvPicPr>
+        <p:blipFill>
+          <a:blip r:embed="rId2"/>
+          <a:srcRect r="21186" b="40423"/>
+          <a:stretch>
+            <a:fillRect/>
+          </a:stretch>
+        </p:blipFill>
+        <p:spPr bwMode="auto">
           <a:xfrm>
-            <a:off x="327084" y="1000108"/>
-            <a:ext cx="7745378" cy="1077218"/>
+            <a:off x="428596" y="785794"/>
+            <a:ext cx="4429156" cy="2357454"/>
           </a:xfrm>
           <a:prstGeom prst="rect">
             <a:avLst/>
           </a:prstGeom>
           <a:noFill/>
-        </p:spPr>
-        <p:txBody>
-          <a:bodyPr wrap="square" rtlCol="0">
-            <a:spAutoFit/>
-          </a:bodyPr>
-          <a:lstStyle/>
-          <a:p>
-            <a:pPr indent="354013">
-              <a:buFont typeface="Arial" pitchFamily="34" charset="0"/>
-              <a:buChar char="•"/>
-            </a:pPr>
-            <a:r>
-              <a:rPr lang="pt-BR" sz="3200" b="1" dirty="0" smtClean="0">
-                <a:solidFill>
-                  <a:schemeClr val="bg1">
-                    <a:lumMod val="65000"/>
-                  </a:schemeClr>
-                </a:solidFill>
-              </a:rPr>
-              <a:t>45543 - Bruno Mancini</a:t>
-            </a:r>
-          </a:p>
-          <a:p>
-            <a:pPr indent="354013">
-              <a:buFont typeface="Arial" pitchFamily="34" charset="0"/>
-              <a:buChar char="•"/>
-            </a:pPr>
-            <a:r>
-              <a:rPr lang="pt-BR" sz="3200" b="1" dirty="0" smtClean="0">
-                <a:solidFill>
-                  <a:schemeClr val="bg1">
-                    <a:lumMod val="65000"/>
-                  </a:schemeClr>
-                </a:solidFill>
-              </a:rPr>
-              <a:t>45543 - Willians Martins de Morais</a:t>
-            </a:r>
-          </a:p>
-        </p:txBody>
-      </p:sp>
+          <a:ln w="9525">
+            <a:solidFill>
+              <a:schemeClr val="tx1"/>
+            </a:solidFill>
+            <a:miter lim="800000"/>
+            <a:headEnd/>
+            <a:tailEnd/>
+          </a:ln>
+          <a:effectLst/>
+        </p:spPr>
+      </p:pic>
+      <p:pic>
+        <p:nvPicPr>
+          <p:cNvPr id="1026" name="Picture 2"/>
+          <p:cNvPicPr>
+            <a:picLocks noChangeAspect="1" noChangeArrowheads="1"/>
+          </p:cNvPicPr>
+          <p:nvPr/>
+        </p:nvPicPr>
+        <p:blipFill>
+          <a:blip r:embed="rId3"/>
+          <a:srcRect/>
+          <a:stretch>
+            <a:fillRect/>
+          </a:stretch>
+        </p:blipFill>
+        <p:spPr bwMode="auto">
+          <a:xfrm>
+            <a:off x="4429124" y="2571744"/>
+            <a:ext cx="4267200" cy="2781300"/>
+          </a:xfrm>
+          <a:prstGeom prst="rect">
+            <a:avLst/>
+          </a:prstGeom>
+          <a:noFill/>
+          <a:ln w="9525">
+            <a:solidFill>
+              <a:schemeClr val="tx1"/>
+            </a:solidFill>
+            <a:miter lim="800000"/>
+            <a:headEnd/>
+            <a:tailEnd/>
+          </a:ln>
+          <a:effectLst/>
+        </p:spPr>
+      </p:pic>
+      <p:pic>
+        <p:nvPicPr>
+          <p:cNvPr id="1027" name="Picture 3"/>
+          <p:cNvPicPr>
+            <a:picLocks noChangeAspect="1" noChangeArrowheads="1"/>
+          </p:cNvPicPr>
+          <p:nvPr/>
+        </p:nvPicPr>
+        <p:blipFill>
+          <a:blip r:embed="rId4"/>
+          <a:srcRect/>
+          <a:stretch>
+            <a:fillRect/>
+          </a:stretch>
+        </p:blipFill>
+        <p:spPr bwMode="auto">
+          <a:xfrm>
+            <a:off x="571472" y="3857628"/>
+            <a:ext cx="4058075" cy="2143140"/>
+          </a:xfrm>
+          <a:prstGeom prst="rect">
+            <a:avLst/>
+          </a:prstGeom>
+          <a:noFill/>
+          <a:ln w="9525">
+            <a:solidFill>
+              <a:schemeClr val="tx1"/>
+            </a:solidFill>
+            <a:miter lim="800000"/>
+            <a:headEnd/>
+            <a:tailEnd/>
+          </a:ln>
+          <a:effectLst/>
+        </p:spPr>
+      </p:pic>
     </p:spTree>
   </p:cSld>
   <p:clrMapOvr>
@@ -3560,7 +3652,7 @@
         <p:spPr>
           <a:xfrm>
             <a:off x="102405" y="109815"/>
-            <a:ext cx="1041375" cy="461665"/>
+            <a:ext cx="1661673" cy="461665"/>
           </a:xfrm>
           <a:prstGeom prst="rect">
             <a:avLst/>
@@ -3576,52 +3668,310 @@
             <a:r>
               <a:rPr lang="pt-BR" sz="2400" b="1" dirty="0" smtClean="0">
                 <a:solidFill>
-                  <a:srgbClr val="FFC000"/>
+                  <a:srgbClr val="FFA10E"/>
                 </a:solidFill>
               </a:rPr>
-              <a:t>Layout</a:t>
+              <a:t>Tecnologias</a:t>
             </a:r>
             <a:endParaRPr lang="pt-BR" sz="2400" b="1" dirty="0">
               <a:solidFill>
-                <a:srgbClr val="FFC000"/>
+                <a:srgbClr val="FFA10E"/>
               </a:solidFill>
             </a:endParaRPr>
           </a:p>
         </p:txBody>
       </p:sp>
-      <p:pic>
-        <p:nvPicPr>
-          <p:cNvPr id="17410" name="Picture 2"/>
-          <p:cNvPicPr>
-            <a:picLocks noChangeAspect="1" noChangeArrowheads="1"/>
-          </p:cNvPicPr>
+      <p:sp>
+        <p:nvSpPr>
+          <p:cNvPr id="6" name="CaixaDeTexto 5"/>
+          <p:cNvSpPr txBox="1"/>
           <p:nvPr/>
-        </p:nvPicPr>
-        <p:blipFill>
-          <a:blip r:embed="rId2"/>
-          <a:srcRect/>
-          <a:stretch>
-            <a:fillRect/>
-          </a:stretch>
-        </p:blipFill>
-        <p:spPr bwMode="auto">
+        </p:nvSpPr>
+        <p:spPr>
           <a:xfrm>
-            <a:off x="1517650" y="1214422"/>
-            <a:ext cx="6108700" cy="609600"/>
+            <a:off x="714348" y="1000109"/>
+            <a:ext cx="7745378" cy="4524315"/>
           </a:xfrm>
           <a:prstGeom prst="rect">
             <a:avLst/>
           </a:prstGeom>
           <a:noFill/>
-          <a:ln w="9525">
-            <a:noFill/>
-            <a:miter lim="800000"/>
-            <a:headEnd/>
-            <a:tailEnd/>
-          </a:ln>
-          <a:effectLst/>
-        </p:spPr>
-      </p:pic>
+        </p:spPr>
+        <p:txBody>
+          <a:bodyPr wrap="square" numCol="2" rtlCol="0">
+            <a:spAutoFit/>
+          </a:bodyPr>
+          <a:lstStyle/>
+          <a:p>
+            <a:pPr indent="354013" algn="just">
+              <a:buFont typeface="Arial" pitchFamily="34" charset="0"/>
+              <a:buChar char="•"/>
+            </a:pPr>
+            <a:r>
+              <a:rPr lang="pt-BR" sz="3600" b="1" dirty="0" smtClean="0">
+                <a:solidFill>
+                  <a:srgbClr val="FFA10E"/>
+                </a:solidFill>
+              </a:rPr>
+              <a:t>XHTML + </a:t>
+            </a:r>
+            <a:r>
+              <a:rPr lang="pt-BR" sz="3600" b="1" dirty="0" smtClean="0">
+                <a:solidFill>
+                  <a:srgbClr val="FFA10E"/>
+                </a:solidFill>
+              </a:rPr>
+              <a:t>JSF</a:t>
+            </a:r>
+            <a:endParaRPr lang="pt-BR" sz="3600" b="1" dirty="0" smtClean="0">
+              <a:solidFill>
+                <a:srgbClr val="FFA10E"/>
+              </a:solidFill>
+            </a:endParaRPr>
+          </a:p>
+          <a:p>
+            <a:pPr indent="354013" algn="just">
+              <a:buFont typeface="Arial" pitchFamily="34" charset="0"/>
+              <a:buChar char="•"/>
+            </a:pPr>
+            <a:r>
+              <a:rPr lang="pt-BR" sz="3600" b="1" dirty="0" smtClean="0">
+                <a:solidFill>
+                  <a:srgbClr val="FFA10E"/>
+                </a:solidFill>
+              </a:rPr>
+              <a:t>JS + CSS</a:t>
+            </a:r>
+          </a:p>
+          <a:p>
+            <a:pPr indent="354013" algn="just">
+              <a:buFont typeface="Arial" pitchFamily="34" charset="0"/>
+              <a:buChar char="•"/>
+            </a:pPr>
+            <a:r>
+              <a:rPr lang="pt-BR" sz="3600" b="1" dirty="0" smtClean="0">
+                <a:solidFill>
+                  <a:srgbClr val="FFA10E"/>
+                </a:solidFill>
+              </a:rPr>
+              <a:t>JQUERY</a:t>
+            </a:r>
+            <a:endParaRPr lang="pt-BR" sz="3600" b="1" dirty="0">
+              <a:solidFill>
+                <a:srgbClr val="FFA10E"/>
+              </a:solidFill>
+            </a:endParaRPr>
+          </a:p>
+          <a:p>
+            <a:pPr indent="354013" algn="just">
+              <a:buFont typeface="Arial" pitchFamily="34" charset="0"/>
+              <a:buChar char="•"/>
+            </a:pPr>
+            <a:r>
+              <a:rPr lang="pt-BR" sz="3600" b="1" dirty="0" smtClean="0">
+                <a:solidFill>
+                  <a:srgbClr val="FFA10E"/>
+                </a:solidFill>
+              </a:rPr>
+              <a:t>AJAX</a:t>
+            </a:r>
+            <a:endParaRPr lang="pt-BR" sz="3600" b="1" dirty="0" smtClean="0">
+              <a:solidFill>
+                <a:srgbClr val="FFA10E"/>
+              </a:solidFill>
+            </a:endParaRPr>
+          </a:p>
+          <a:p>
+            <a:pPr indent="354013" algn="just">
+              <a:buFont typeface="Arial" pitchFamily="34" charset="0"/>
+              <a:buChar char="•"/>
+            </a:pPr>
+            <a:r>
+              <a:rPr lang="pt-BR" sz="3600" b="1" dirty="0" smtClean="0">
+                <a:solidFill>
+                  <a:srgbClr val="FFA10E"/>
+                </a:solidFill>
+              </a:rPr>
+              <a:t>MYSQL</a:t>
+            </a:r>
+            <a:endParaRPr lang="pt-BR" sz="3600" b="1" dirty="0" smtClean="0">
+              <a:solidFill>
+                <a:srgbClr val="FFA10E"/>
+              </a:solidFill>
+            </a:endParaRPr>
+          </a:p>
+          <a:p>
+            <a:pPr indent="354013" algn="just">
+              <a:buFont typeface="Arial" pitchFamily="34" charset="0"/>
+              <a:buChar char="•"/>
+            </a:pPr>
+            <a:r>
+              <a:rPr lang="pt-BR" sz="3600" b="1" dirty="0" smtClean="0">
+                <a:solidFill>
+                  <a:srgbClr val="FFA10E"/>
+                </a:solidFill>
+              </a:rPr>
+              <a:t>ECLIPSE</a:t>
+            </a:r>
+            <a:endParaRPr lang="pt-BR" sz="3600" b="1" dirty="0" smtClean="0">
+              <a:solidFill>
+                <a:srgbClr val="FFA10E"/>
+              </a:solidFill>
+            </a:endParaRPr>
+          </a:p>
+          <a:p>
+            <a:pPr indent="354013" algn="just">
+              <a:buFont typeface="Arial" pitchFamily="34" charset="0"/>
+              <a:buChar char="•"/>
+            </a:pPr>
+            <a:r>
+              <a:rPr lang="pt-BR" sz="3600" b="1" dirty="0" smtClean="0">
+                <a:solidFill>
+                  <a:srgbClr val="FFA10E"/>
+                </a:solidFill>
+              </a:rPr>
+              <a:t>TRELLO</a:t>
+            </a:r>
+            <a:endParaRPr lang="pt-BR" sz="3600" b="1" dirty="0" smtClean="0">
+              <a:solidFill>
+                <a:srgbClr val="FFA10E"/>
+              </a:solidFill>
+            </a:endParaRPr>
+          </a:p>
+          <a:p>
+            <a:pPr indent="354013" algn="just">
+              <a:buFont typeface="Arial" pitchFamily="34" charset="0"/>
+              <a:buChar char="•"/>
+            </a:pPr>
+            <a:r>
+              <a:rPr lang="pt-BR" sz="3600" b="1" dirty="0" smtClean="0">
+                <a:solidFill>
+                  <a:srgbClr val="FFA10E"/>
+                </a:solidFill>
+              </a:rPr>
+              <a:t>JPA –HIBERNATE</a:t>
+            </a:r>
+          </a:p>
+          <a:p>
+            <a:pPr indent="354013" algn="just">
+              <a:buFont typeface="Arial" pitchFamily="34" charset="0"/>
+              <a:buChar char="•"/>
+            </a:pPr>
+            <a:r>
+              <a:rPr lang="pt-BR" sz="3600" b="1" dirty="0" err="1" smtClean="0">
+                <a:solidFill>
+                  <a:srgbClr val="FFA10E"/>
+                </a:solidFill>
+              </a:rPr>
+              <a:t>SERVLET’S</a:t>
+            </a:r>
+            <a:endParaRPr lang="pt-BR" sz="3600" b="1" dirty="0" smtClean="0">
+              <a:solidFill>
+                <a:srgbClr val="FFA10E"/>
+              </a:solidFill>
+            </a:endParaRPr>
+          </a:p>
+          <a:p>
+            <a:pPr indent="354013" algn="just">
+              <a:buFont typeface="Arial" pitchFamily="34" charset="0"/>
+              <a:buChar char="•"/>
+            </a:pPr>
+            <a:r>
+              <a:rPr lang="pt-BR" sz="3600" b="1" dirty="0" smtClean="0">
+                <a:solidFill>
+                  <a:srgbClr val="FFA10E"/>
+                </a:solidFill>
+              </a:rPr>
+              <a:t>TOMCAT</a:t>
+            </a:r>
+            <a:endParaRPr lang="pt-BR" sz="3600" b="1" dirty="0" smtClean="0">
+              <a:solidFill>
+                <a:srgbClr val="FFA10E"/>
+              </a:solidFill>
+            </a:endParaRPr>
+          </a:p>
+          <a:p>
+            <a:pPr indent="354013" algn="just">
+              <a:buFont typeface="Arial" pitchFamily="34" charset="0"/>
+              <a:buChar char="•"/>
+            </a:pPr>
+            <a:r>
+              <a:rPr lang="pt-BR" sz="3600" b="1" dirty="0" smtClean="0">
+                <a:solidFill>
+                  <a:srgbClr val="FFA10E"/>
+                </a:solidFill>
+              </a:rPr>
+              <a:t>BOOTSTRAP</a:t>
+            </a:r>
+          </a:p>
+          <a:p>
+            <a:pPr indent="354013" algn="just">
+              <a:buFont typeface="Arial" pitchFamily="34" charset="0"/>
+              <a:buChar char="•"/>
+            </a:pPr>
+            <a:r>
+              <a:rPr lang="pt-BR" sz="3600" b="1" dirty="0" smtClean="0">
+                <a:solidFill>
+                  <a:srgbClr val="FFA10E"/>
+                </a:solidFill>
+              </a:rPr>
+              <a:t>PHOTOSHOP</a:t>
+            </a:r>
+          </a:p>
+          <a:p>
+            <a:pPr indent="354013" algn="just">
+              <a:buFont typeface="Arial" pitchFamily="34" charset="0"/>
+              <a:buChar char="•"/>
+            </a:pPr>
+            <a:r>
+              <a:rPr lang="pt-BR" sz="3600" b="1" dirty="0" smtClean="0">
+                <a:solidFill>
+                  <a:srgbClr val="FFA10E"/>
+                </a:solidFill>
+              </a:rPr>
+              <a:t>MAVEN</a:t>
+            </a:r>
+            <a:endParaRPr lang="pt-BR" sz="3600" b="1" dirty="0" smtClean="0">
+              <a:solidFill>
+                <a:srgbClr val="FFA10E"/>
+              </a:solidFill>
+            </a:endParaRPr>
+          </a:p>
+          <a:p>
+            <a:pPr indent="354013" algn="just">
+              <a:buFont typeface="Arial" pitchFamily="34" charset="0"/>
+              <a:buChar char="•"/>
+            </a:pPr>
+            <a:r>
+              <a:rPr lang="pt-BR" sz="3600" b="1" dirty="0" smtClean="0">
+                <a:solidFill>
+                  <a:srgbClr val="FFA10E"/>
+                </a:solidFill>
+              </a:rPr>
+              <a:t>JUNIT</a:t>
+            </a:r>
+          </a:p>
+          <a:p>
+            <a:pPr indent="354013" algn="just">
+              <a:buFont typeface="Arial" pitchFamily="34" charset="0"/>
+              <a:buChar char="•"/>
+            </a:pPr>
+            <a:r>
+              <a:rPr lang="pt-BR" sz="3600" b="1" dirty="0" smtClean="0">
+                <a:solidFill>
+                  <a:srgbClr val="FFA10E"/>
+                </a:solidFill>
+              </a:rPr>
+              <a:t>GIT / GITHUB</a:t>
+            </a:r>
+            <a:endParaRPr lang="pt-BR" sz="3600" b="1" dirty="0" smtClean="0">
+              <a:solidFill>
+                <a:srgbClr val="FFA10E"/>
+              </a:solidFill>
+            </a:endParaRPr>
+          </a:p>
+        </p:txBody>
+      </p:sp>
     </p:spTree>
   </p:cSld>
   <p:clrMapOvr>
@@ -3663,7 +4013,7 @@
         <p:spPr>
           <a:xfrm>
             <a:off x="102405" y="109815"/>
-            <a:ext cx="1859805" cy="461665"/>
+            <a:ext cx="1632948" cy="461665"/>
           </a:xfrm>
           <a:prstGeom prst="rect">
             <a:avLst/>
@@ -3679,14 +4029,242 @@
             <a:r>
               <a:rPr lang="pt-BR" sz="2400" b="1" dirty="0" smtClean="0">
                 <a:solidFill>
-                  <a:srgbClr val="FFC000"/>
+                  <a:srgbClr val="FFA10E"/>
+                </a:solidFill>
+              </a:rPr>
+              <a:t>Integrantes</a:t>
+            </a:r>
+            <a:endParaRPr lang="pt-BR" sz="2400" b="1" dirty="0">
+              <a:solidFill>
+                <a:srgbClr val="FFA10E"/>
+              </a:solidFill>
+            </a:endParaRPr>
+          </a:p>
+        </p:txBody>
+      </p:sp>
+      <p:sp>
+        <p:nvSpPr>
+          <p:cNvPr id="8" name="CaixaDeTexto 7"/>
+          <p:cNvSpPr txBox="1"/>
+          <p:nvPr/>
+        </p:nvSpPr>
+        <p:spPr>
+          <a:xfrm>
+            <a:off x="327084" y="1000108"/>
+            <a:ext cx="7745378" cy="1077218"/>
+          </a:xfrm>
+          <a:prstGeom prst="rect">
+            <a:avLst/>
+          </a:prstGeom>
+          <a:noFill/>
+        </p:spPr>
+        <p:txBody>
+          <a:bodyPr wrap="square" rtlCol="0">
+            <a:spAutoFit/>
+          </a:bodyPr>
+          <a:lstStyle/>
+          <a:p>
+            <a:pPr indent="354013">
+              <a:buFont typeface="Arial" pitchFamily="34" charset="0"/>
+              <a:buChar char="•"/>
+            </a:pPr>
+            <a:r>
+              <a:rPr lang="pt-BR" sz="3200" b="1" dirty="0" smtClean="0">
+                <a:solidFill>
+                  <a:schemeClr val="bg1">
+                    <a:lumMod val="65000"/>
+                  </a:schemeClr>
+                </a:solidFill>
+              </a:rPr>
+              <a:t>45543 - Bruno Mancini</a:t>
+            </a:r>
+          </a:p>
+          <a:p>
+            <a:pPr indent="354013">
+              <a:buFont typeface="Arial" pitchFamily="34" charset="0"/>
+              <a:buChar char="•"/>
+            </a:pPr>
+            <a:r>
+              <a:rPr lang="pt-BR" sz="3200" b="1" dirty="0" smtClean="0">
+                <a:solidFill>
+                  <a:schemeClr val="bg1">
+                    <a:lumMod val="65000"/>
+                  </a:schemeClr>
+                </a:solidFill>
+              </a:rPr>
+              <a:t>45543 - Willians Martins de Morais</a:t>
+            </a:r>
+          </a:p>
+        </p:txBody>
+      </p:sp>
+    </p:spTree>
+  </p:cSld>
+  <p:clrMapOvr>
+    <a:masterClrMapping/>
+  </p:clrMapOvr>
+  <p:timing>
+    <p:tnLst>
+      <p:par>
+        <p:cTn id="1" dur="indefinite" restart="never" nodeType="tmRoot"/>
+      </p:par>
+    </p:tnLst>
+  </p:timing>
+</p:sld>
+</file>
+
+<file path=ppt/slides/slide6.xml><?xml version="1.0" encoding="utf-8"?>
+<p:sld xmlns:a="http://schemas.openxmlformats.org/drawingml/2006/main" xmlns:r="http://schemas.openxmlformats.org/officeDocument/2006/relationships" xmlns:p="http://schemas.openxmlformats.org/presentationml/2006/main">
+  <p:cSld>
+    <p:spTree>
+      <p:nvGrpSpPr>
+        <p:cNvPr id="1" name=""/>
+        <p:cNvGrpSpPr/>
+        <p:nvPr/>
+      </p:nvGrpSpPr>
+      <p:grpSpPr>
+        <a:xfrm>
+          <a:off x="0" y="0"/>
+          <a:ext cx="0" cy="0"/>
+          <a:chOff x="0" y="0"/>
+          <a:chExt cx="0" cy="0"/>
+        </a:xfrm>
+      </p:grpSpPr>
+      <p:sp>
+        <p:nvSpPr>
+          <p:cNvPr id="7" name="CaixaDeTexto 6"/>
+          <p:cNvSpPr txBox="1"/>
+          <p:nvPr/>
+        </p:nvSpPr>
+        <p:spPr>
+          <a:xfrm>
+            <a:off x="102405" y="109815"/>
+            <a:ext cx="1041375" cy="461665"/>
+          </a:xfrm>
+          <a:prstGeom prst="rect">
+            <a:avLst/>
+          </a:prstGeom>
+          <a:noFill/>
+        </p:spPr>
+        <p:txBody>
+          <a:bodyPr wrap="none" rtlCol="0">
+            <a:spAutoFit/>
+          </a:bodyPr>
+          <a:lstStyle/>
+          <a:p>
+            <a:r>
+              <a:rPr lang="pt-BR" sz="2400" b="1" dirty="0" smtClean="0">
+                <a:solidFill>
+                  <a:srgbClr val="FFA10E"/>
+                </a:solidFill>
+              </a:rPr>
+              <a:t>Layout</a:t>
+            </a:r>
+            <a:endParaRPr lang="pt-BR" sz="2400" b="1" dirty="0">
+              <a:solidFill>
+                <a:srgbClr val="FFA10E"/>
+              </a:solidFill>
+            </a:endParaRPr>
+          </a:p>
+        </p:txBody>
+      </p:sp>
+      <p:pic>
+        <p:nvPicPr>
+          <p:cNvPr id="17410" name="Picture 2"/>
+          <p:cNvPicPr>
+            <a:picLocks noChangeAspect="1" noChangeArrowheads="1"/>
+          </p:cNvPicPr>
+          <p:nvPr/>
+        </p:nvPicPr>
+        <p:blipFill>
+          <a:blip r:embed="rId2"/>
+          <a:srcRect/>
+          <a:stretch>
+            <a:fillRect/>
+          </a:stretch>
+        </p:blipFill>
+        <p:spPr bwMode="auto">
+          <a:xfrm>
+            <a:off x="1517650" y="1214422"/>
+            <a:ext cx="6108700" cy="609600"/>
+          </a:xfrm>
+          <a:prstGeom prst="rect">
+            <a:avLst/>
+          </a:prstGeom>
+          <a:noFill/>
+          <a:ln w="9525">
+            <a:noFill/>
+            <a:miter lim="800000"/>
+            <a:headEnd/>
+            <a:tailEnd/>
+          </a:ln>
+          <a:effectLst/>
+        </p:spPr>
+      </p:pic>
+    </p:spTree>
+  </p:cSld>
+  <p:clrMapOvr>
+    <a:masterClrMapping/>
+  </p:clrMapOvr>
+  <p:timing>
+    <p:tnLst>
+      <p:par>
+        <p:cTn id="1" dur="indefinite" restart="never" nodeType="tmRoot"/>
+      </p:par>
+    </p:tnLst>
+  </p:timing>
+</p:sld>
+</file>
+
+<file path=ppt/slides/slide7.xml><?xml version="1.0" encoding="utf-8"?>
+<p:sld xmlns:a="http://schemas.openxmlformats.org/drawingml/2006/main" xmlns:r="http://schemas.openxmlformats.org/officeDocument/2006/relationships" xmlns:p="http://schemas.openxmlformats.org/presentationml/2006/main">
+  <p:cSld>
+    <p:spTree>
+      <p:nvGrpSpPr>
+        <p:cNvPr id="1" name=""/>
+        <p:cNvGrpSpPr/>
+        <p:nvPr/>
+      </p:nvGrpSpPr>
+      <p:grpSpPr>
+        <a:xfrm>
+          <a:off x="0" y="0"/>
+          <a:ext cx="0" cy="0"/>
+          <a:chOff x="0" y="0"/>
+          <a:chExt cx="0" cy="0"/>
+        </a:xfrm>
+      </p:grpSpPr>
+      <p:sp>
+        <p:nvSpPr>
+          <p:cNvPr id="7" name="CaixaDeTexto 6"/>
+          <p:cNvSpPr txBox="1"/>
+          <p:nvPr/>
+        </p:nvSpPr>
+        <p:spPr>
+          <a:xfrm>
+            <a:off x="102405" y="109815"/>
+            <a:ext cx="1859805" cy="461665"/>
+          </a:xfrm>
+          <a:prstGeom prst="rect">
+            <a:avLst/>
+          </a:prstGeom>
+          <a:noFill/>
+        </p:spPr>
+        <p:txBody>
+          <a:bodyPr wrap="none" rtlCol="0">
+            <a:spAutoFit/>
+          </a:bodyPr>
+          <a:lstStyle/>
+          <a:p>
+            <a:r>
+              <a:rPr lang="pt-BR" sz="2400" b="1" dirty="0" smtClean="0">
+                <a:solidFill>
+                  <a:srgbClr val="FFA10E"/>
                 </a:solidFill>
               </a:rPr>
               <a:t>Casos de Uso</a:t>
             </a:r>
             <a:endParaRPr lang="pt-BR" sz="2400" b="1" dirty="0">
               <a:solidFill>
-                <a:srgbClr val="FFC000"/>
+                <a:srgbClr val="FFA10E"/>
               </a:solidFill>
             </a:endParaRPr>
           </a:p>

</xml_diff>